<commit_message>
explained OOP with examples
</commit_message>
<xml_diff>
--- a/Java_Mentoring_Revised.pptx
+++ b/Java_Mentoring_Revised.pptx
@@ -11526,7 +11526,7 @@
                 </a:solidFill>
                 <a:effectLst/>
               </a:rPr>
-              <a:t>Encapsulation is rapping of data and methods into a single unit.</a:t>
+              <a:t>Encapsulation is wrapping of data and methods into a single unit.</a:t>
             </a:r>
           </a:p>
           <a:p>
@@ -12911,7 +12911,7 @@
                   <a:schemeClr val="accent5"/>
                 </a:solidFill>
               </a:rPr>
-              <a:t>We can implement abstraction on classes and methods. Abstract method means incomplete method. The child class is responsible to implement the incomplete methods.</a:t>
+              <a:t>We can implement abstraction on classes and methods. Abstract method means incomplete method. The child class or implementing class is responsible to implement the incomplete methods.</a:t>
             </a:r>
             <a:endParaRPr lang="en-US" dirty="0">
               <a:solidFill>

</xml_diff>